<commit_message>
work on modules 3 and 4
</commit_message>
<xml_diff>
--- a/graphics.pptx
+++ b/graphics.pptx
@@ -6,6 +6,7 @@
   </p:sldMasterIdLst>
   <p:sldIdLst>
     <p:sldId id="258" r:id="rId2"/>
+    <p:sldId id="259" r:id="rId3"/>
   </p:sldIdLst>
   <p:sldSz cx="12192000" cy="6858000"/>
   <p:notesSz cx="6858000" cy="9144000"/>
@@ -104,6 +105,11 @@
       </a:defRPr>
     </a:lvl9pPr>
   </p:defaultTextStyle>
+  <p:extLst>
+    <p:ext uri="{EFAFB233-063F-42B5-8137-9DF3F51BA10A}">
+      <p15:sldGuideLst xmlns:p15="http://schemas.microsoft.com/office/powerpoint/2012/main"/>
+    </p:ext>
+  </p:extLst>
 </p:presentation>
 </file>
 
@@ -254,7 +260,7 @@
           <a:p>
             <a:fld id="{9E04E7CE-2713-1040-A5A4-CE45DCEDD4AF}" type="datetimeFigureOut">
               <a:rPr lang="en-US" smtClean="0"/>
-              <a:t>12/7/19</a:t>
+              <a:t>2/19/20</a:t>
             </a:fld>
             <a:endParaRPr lang="en-US"/>
           </a:p>
@@ -452,7 +458,7 @@
           <a:p>
             <a:fld id="{9E04E7CE-2713-1040-A5A4-CE45DCEDD4AF}" type="datetimeFigureOut">
               <a:rPr lang="en-US" smtClean="0"/>
-              <a:t>12/7/19</a:t>
+              <a:t>2/19/20</a:t>
             </a:fld>
             <a:endParaRPr lang="en-US"/>
           </a:p>
@@ -660,7 +666,7 @@
           <a:p>
             <a:fld id="{9E04E7CE-2713-1040-A5A4-CE45DCEDD4AF}" type="datetimeFigureOut">
               <a:rPr lang="en-US" smtClean="0"/>
-              <a:t>12/7/19</a:t>
+              <a:t>2/19/20</a:t>
             </a:fld>
             <a:endParaRPr lang="en-US"/>
           </a:p>
@@ -858,7 +864,7 @@
           <a:p>
             <a:fld id="{9E04E7CE-2713-1040-A5A4-CE45DCEDD4AF}" type="datetimeFigureOut">
               <a:rPr lang="en-US" smtClean="0"/>
-              <a:t>12/7/19</a:t>
+              <a:t>2/19/20</a:t>
             </a:fld>
             <a:endParaRPr lang="en-US"/>
           </a:p>
@@ -1133,7 +1139,7 @@
           <a:p>
             <a:fld id="{9E04E7CE-2713-1040-A5A4-CE45DCEDD4AF}" type="datetimeFigureOut">
               <a:rPr lang="en-US" smtClean="0"/>
-              <a:t>12/7/19</a:t>
+              <a:t>2/19/20</a:t>
             </a:fld>
             <a:endParaRPr lang="en-US"/>
           </a:p>
@@ -1398,7 +1404,7 @@
           <a:p>
             <a:fld id="{9E04E7CE-2713-1040-A5A4-CE45DCEDD4AF}" type="datetimeFigureOut">
               <a:rPr lang="en-US" smtClean="0"/>
-              <a:t>12/7/19</a:t>
+              <a:t>2/19/20</a:t>
             </a:fld>
             <a:endParaRPr lang="en-US"/>
           </a:p>
@@ -1810,7 +1816,7 @@
           <a:p>
             <a:fld id="{9E04E7CE-2713-1040-A5A4-CE45DCEDD4AF}" type="datetimeFigureOut">
               <a:rPr lang="en-US" smtClean="0"/>
-              <a:t>12/7/19</a:t>
+              <a:t>2/19/20</a:t>
             </a:fld>
             <a:endParaRPr lang="en-US"/>
           </a:p>
@@ -1951,7 +1957,7 @@
           <a:p>
             <a:fld id="{9E04E7CE-2713-1040-A5A4-CE45DCEDD4AF}" type="datetimeFigureOut">
               <a:rPr lang="en-US" smtClean="0"/>
-              <a:t>12/7/19</a:t>
+              <a:t>2/19/20</a:t>
             </a:fld>
             <a:endParaRPr lang="en-US"/>
           </a:p>
@@ -2064,7 +2070,7 @@
           <a:p>
             <a:fld id="{9E04E7CE-2713-1040-A5A4-CE45DCEDD4AF}" type="datetimeFigureOut">
               <a:rPr lang="en-US" smtClean="0"/>
-              <a:t>12/7/19</a:t>
+              <a:t>2/19/20</a:t>
             </a:fld>
             <a:endParaRPr lang="en-US"/>
           </a:p>
@@ -2375,7 +2381,7 @@
           <a:p>
             <a:fld id="{9E04E7CE-2713-1040-A5A4-CE45DCEDD4AF}" type="datetimeFigureOut">
               <a:rPr lang="en-US" smtClean="0"/>
-              <a:t>12/7/19</a:t>
+              <a:t>2/19/20</a:t>
             </a:fld>
             <a:endParaRPr lang="en-US"/>
           </a:p>
@@ -2663,7 +2669,7 @@
           <a:p>
             <a:fld id="{9E04E7CE-2713-1040-A5A4-CE45DCEDD4AF}" type="datetimeFigureOut">
               <a:rPr lang="en-US" smtClean="0"/>
-              <a:t>12/7/19</a:t>
+              <a:t>2/19/20</a:t>
             </a:fld>
             <a:endParaRPr lang="en-US"/>
           </a:p>
@@ -2904,7 +2910,7 @@
           <a:p>
             <a:fld id="{9E04E7CE-2713-1040-A5A4-CE45DCEDD4AF}" type="datetimeFigureOut">
               <a:rPr lang="en-US" smtClean="0"/>
-              <a:t>12/7/19</a:t>
+              <a:t>2/19/20</a:t>
             </a:fld>
             <a:endParaRPr lang="en-US"/>
           </a:p>
@@ -3323,10 +3329,10 @@
       </p:grpSpPr>
       <p:sp>
         <p:nvSpPr>
-          <p:cNvPr id="3" name="Oval 2">
-            <a:extLst>
-              <a:ext uri="{FF2B5EF4-FFF2-40B4-BE49-F238E27FC236}">
-                <a16:creationId xmlns:a16="http://schemas.microsoft.com/office/drawing/2014/main" id="{C4E2AD9A-20A4-FC4C-B2F2-4493EA6F855D}"/>
+          <p:cNvPr id="7" name="Rectangle 6">
+            <a:extLst>
+              <a:ext uri="{FF2B5EF4-FFF2-40B4-BE49-F238E27FC236}">
+                <a16:creationId xmlns:a16="http://schemas.microsoft.com/office/drawing/2014/main" id="{5B9F92DB-CA98-9F4D-AE08-45528DC1EAF0}"/>
               </a:ext>
             </a:extLst>
           </p:cNvPr>
@@ -3335,7 +3341,62 @@
         </p:nvSpPr>
         <p:spPr>
           <a:xfrm>
-            <a:off x="5339255" y="2638097"/>
+            <a:off x="336331" y="441434"/>
+            <a:ext cx="11561379" cy="4572000"/>
+          </a:xfrm>
+          <a:prstGeom prst="rect">
+            <a:avLst/>
+          </a:prstGeom>
+          <a:solidFill>
+            <a:schemeClr val="bg1"/>
+          </a:solidFill>
+          <a:ln>
+            <a:noFill/>
+          </a:ln>
+        </p:spPr>
+        <p:style>
+          <a:lnRef idx="2">
+            <a:schemeClr val="accent1">
+              <a:shade val="50000"/>
+            </a:schemeClr>
+          </a:lnRef>
+          <a:fillRef idx="1">
+            <a:schemeClr val="accent1"/>
+          </a:fillRef>
+          <a:effectRef idx="0">
+            <a:schemeClr val="accent1"/>
+          </a:effectRef>
+          <a:fontRef idx="minor">
+            <a:schemeClr val="lt1"/>
+          </a:fontRef>
+        </p:style>
+        <p:txBody>
+          <a:bodyPr rtlCol="0" anchor="ctr"/>
+          <a:lstStyle/>
+          <a:p>
+            <a:pPr algn="ctr"/>
+            <a:r>
+              <a:rPr lang="en-KW"/>
+              <a:t> </a:t>
+            </a:r>
+          </a:p>
+        </p:txBody>
+      </p:sp>
+      <p:sp>
+        <p:nvSpPr>
+          <p:cNvPr id="3" name="Oval 2">
+            <a:extLst>
+              <a:ext uri="{FF2B5EF4-FFF2-40B4-BE49-F238E27FC236}">
+                <a16:creationId xmlns:a16="http://schemas.microsoft.com/office/drawing/2014/main" id="{C4E2AD9A-20A4-FC4C-B2F2-4493EA6F855D}"/>
+              </a:ext>
+            </a:extLst>
+          </p:cNvPr>
+          <p:cNvSpPr/>
+          <p:nvPr/>
+        </p:nvSpPr>
+        <p:spPr>
+          <a:xfrm>
+            <a:off x="4529959" y="2406869"/>
             <a:ext cx="1124607" cy="1124607"/>
           </a:xfrm>
           <a:prstGeom prst="ellipse">
@@ -3403,7 +3464,7 @@
         </p:nvSpPr>
         <p:spPr>
           <a:xfrm>
-            <a:off x="1713186" y="1445173"/>
+            <a:off x="903890" y="1213945"/>
             <a:ext cx="1534509" cy="635876"/>
           </a:xfrm>
           <a:prstGeom prst="rect">
@@ -3458,7 +3519,7 @@
         </p:nvSpPr>
         <p:spPr>
           <a:xfrm>
-            <a:off x="1319048" y="2320159"/>
+            <a:off x="509752" y="2088931"/>
             <a:ext cx="1928648" cy="635876"/>
           </a:xfrm>
           <a:prstGeom prst="rect">
@@ -3513,7 +3574,7 @@
         </p:nvSpPr>
         <p:spPr>
           <a:xfrm>
-            <a:off x="2207172" y="3901966"/>
+            <a:off x="1397876" y="3670738"/>
             <a:ext cx="1040524" cy="635876"/>
           </a:xfrm>
           <a:prstGeom prst="rect">
@@ -3571,7 +3632,7 @@
         </p:nvCxnSpPr>
         <p:spPr>
           <a:xfrm>
-            <a:off x="3247695" y="1763111"/>
+            <a:off x="2438399" y="1531883"/>
             <a:ext cx="2091560" cy="1437290"/>
           </a:xfrm>
           <a:prstGeom prst="straightConnector1">
@@ -3616,7 +3677,7 @@
         </p:nvCxnSpPr>
         <p:spPr>
           <a:xfrm>
-            <a:off x="3247696" y="2638097"/>
+            <a:off x="2438400" y="2406869"/>
             <a:ext cx="2091559" cy="562304"/>
           </a:xfrm>
           <a:prstGeom prst="straightConnector1">
@@ -3661,7 +3722,7 @@
         </p:nvCxnSpPr>
         <p:spPr>
           <a:xfrm flipV="1">
-            <a:off x="3247696" y="3200402"/>
+            <a:off x="2438400" y="2969174"/>
             <a:ext cx="2091559" cy="1019502"/>
           </a:xfrm>
           <a:prstGeom prst="straightConnector1">
@@ -3703,7 +3764,7 @@
         </p:nvSpPr>
         <p:spPr>
           <a:xfrm>
-            <a:off x="1319048" y="3121573"/>
+            <a:off x="509752" y="2890345"/>
             <a:ext cx="1928648" cy="635876"/>
           </a:xfrm>
           <a:prstGeom prst="rect">
@@ -3760,7 +3821,7 @@
         </p:nvSpPr>
         <p:spPr>
           <a:xfrm>
-            <a:off x="3712778" y="1721069"/>
+            <a:off x="2903482" y="1489841"/>
             <a:ext cx="580697" cy="635876"/>
           </a:xfrm>
           <a:prstGeom prst="rect">
@@ -3825,7 +3886,7 @@
         </p:nvSpPr>
         <p:spPr>
           <a:xfrm>
-            <a:off x="3712778" y="2289943"/>
+            <a:off x="2903482" y="2058715"/>
             <a:ext cx="580697" cy="635876"/>
           </a:xfrm>
           <a:prstGeom prst="rect">
@@ -3890,7 +3951,7 @@
         </p:nvSpPr>
         <p:spPr>
           <a:xfrm>
-            <a:off x="3712778" y="3757449"/>
+            <a:off x="2903482" y="3526221"/>
             <a:ext cx="819807" cy="712074"/>
           </a:xfrm>
           <a:prstGeom prst="rect">
@@ -3968,7 +4029,7 @@
         </p:blipFill>
         <p:spPr>
           <a:xfrm>
-            <a:off x="7108614" y="2081049"/>
+            <a:off x="6384953" y="1531883"/>
             <a:ext cx="3159505" cy="3059362"/>
           </a:xfrm>
           <a:prstGeom prst="rect">
@@ -3990,7 +4051,7 @@
         </p:nvSpPr>
         <p:spPr>
           <a:xfrm>
-            <a:off x="7255347" y="1158765"/>
+            <a:off x="6531686" y="609599"/>
             <a:ext cx="3145718" cy="1124607"/>
           </a:xfrm>
           <a:prstGeom prst="rect">
@@ -4050,7 +4111,7 @@
         </p:nvCxnSpPr>
         <p:spPr>
           <a:xfrm>
-            <a:off x="6463862" y="3200401"/>
+            <a:off x="5654566" y="2969173"/>
             <a:ext cx="511806" cy="0"/>
           </a:xfrm>
           <a:prstGeom prst="straightConnector1">
@@ -4078,6 +4139,118 @@
           </a:fontRef>
         </p:style>
       </p:cxnSp>
+      <p:cxnSp>
+        <p:nvCxnSpPr>
+          <p:cNvPr id="17" name="Straight Arrow Connector 16">
+            <a:extLst>
+              <a:ext uri="{FF2B5EF4-FFF2-40B4-BE49-F238E27FC236}">
+                <a16:creationId xmlns:a16="http://schemas.microsoft.com/office/drawing/2014/main" id="{C0FBCAF5-E7ED-8548-BF6B-379B500672BD}"/>
+              </a:ext>
+            </a:extLst>
+          </p:cNvPr>
+          <p:cNvCxnSpPr>
+            <a:cxnSpLocks/>
+          </p:cNvCxnSpPr>
+          <p:nvPr/>
+        </p:nvCxnSpPr>
+        <p:spPr>
+          <a:xfrm>
+            <a:off x="9677404" y="2969173"/>
+            <a:ext cx="511806" cy="0"/>
+          </a:xfrm>
+          <a:prstGeom prst="straightConnector1">
+            <a:avLst/>
+          </a:prstGeom>
+          <a:ln w="76200">
+            <a:solidFill>
+              <a:schemeClr val="tx1"/>
+            </a:solidFill>
+            <a:tailEnd type="triangle"/>
+          </a:ln>
+        </p:spPr>
+        <p:style>
+          <a:lnRef idx="1">
+            <a:schemeClr val="accent1"/>
+          </a:lnRef>
+          <a:fillRef idx="0">
+            <a:schemeClr val="accent1"/>
+          </a:fillRef>
+          <a:effectRef idx="0">
+            <a:schemeClr val="accent1"/>
+          </a:effectRef>
+          <a:fontRef idx="minor">
+            <a:schemeClr val="tx1"/>
+          </a:fontRef>
+        </p:style>
+      </p:cxnSp>
+      <p:sp>
+        <p:nvSpPr>
+          <p:cNvPr id="18" name="Rectangle 17">
+            <a:extLst>
+              <a:ext uri="{FF2B5EF4-FFF2-40B4-BE49-F238E27FC236}">
+                <a16:creationId xmlns:a16="http://schemas.microsoft.com/office/drawing/2014/main" id="{77E4FD27-A3F4-624E-AC67-F604DF475DE5}"/>
+              </a:ext>
+            </a:extLst>
+          </p:cNvPr>
+          <p:cNvSpPr/>
+          <p:nvPr/>
+        </p:nvSpPr>
+        <p:spPr>
+          <a:xfrm>
+            <a:off x="9544458" y="2328041"/>
+            <a:ext cx="3145718" cy="1124607"/>
+          </a:xfrm>
+          <a:prstGeom prst="rect">
+            <a:avLst/>
+          </a:prstGeom>
+          <a:noFill/>
+          <a:ln w="38100">
+            <a:noFill/>
+          </a:ln>
+        </p:spPr>
+        <p:style>
+          <a:lnRef idx="2">
+            <a:schemeClr val="accent1">
+              <a:shade val="50000"/>
+            </a:schemeClr>
+          </a:lnRef>
+          <a:fillRef idx="1">
+            <a:schemeClr val="accent1"/>
+          </a:fillRef>
+          <a:effectRef idx="0">
+            <a:schemeClr val="accent1"/>
+          </a:effectRef>
+          <a:fontRef idx="minor">
+            <a:schemeClr val="lt1"/>
+          </a:fontRef>
+        </p:style>
+        <p:txBody>
+          <a:bodyPr rtlCol="0" anchor="ctr"/>
+          <a:lstStyle/>
+          <a:p>
+            <a:pPr algn="ctr"/>
+            <a:r>
+              <a:rPr lang="en-US" sz="2800" b="1" dirty="0">
+                <a:solidFill>
+                  <a:schemeClr val="tx1"/>
+                </a:solidFill>
+              </a:rPr>
+              <a:t>Neuron </a:t>
+            </a:r>
+          </a:p>
+          <a:p>
+            <a:pPr algn="ctr"/>
+            <a:r>
+              <a:rPr lang="en-US" sz="2800" b="1" dirty="0">
+                <a:solidFill>
+                  <a:schemeClr val="tx1"/>
+                </a:solidFill>
+              </a:rPr>
+              <a:t>Output</a:t>
+            </a:r>
+          </a:p>
+        </p:txBody>
+      </p:sp>
     </p:spTree>
     <p:extLst>
       <p:ext uri="{BB962C8B-B14F-4D97-AF65-F5344CB8AC3E}">
@@ -4088,6 +4261,614 @@
   <p:clrMapOvr>
     <a:masterClrMapping/>
   </p:clrMapOvr>
+</p:sld>
+</file>
+
+<file path=ppt/slides/slide2.xml><?xml version="1.0" encoding="utf-8"?>
+<p:sld xmlns:a="http://schemas.openxmlformats.org/drawingml/2006/main" xmlns:r="http://schemas.openxmlformats.org/officeDocument/2006/relationships" xmlns:p="http://schemas.openxmlformats.org/presentationml/2006/main">
+  <p:cSld>
+    <p:spTree>
+      <p:nvGrpSpPr>
+        <p:cNvPr id="1" name=""/>
+        <p:cNvGrpSpPr/>
+        <p:nvPr/>
+      </p:nvGrpSpPr>
+      <p:grpSpPr>
+        <a:xfrm>
+          <a:off x="0" y="0"/>
+          <a:ext cx="0" cy="0"/>
+          <a:chOff x="0" y="0"/>
+          <a:chExt cx="0" cy="0"/>
+        </a:xfrm>
+      </p:grpSpPr>
+      <p:sp>
+        <p:nvSpPr>
+          <p:cNvPr id="11" name="Rectangle 10">
+            <a:extLst>
+              <a:ext uri="{FF2B5EF4-FFF2-40B4-BE49-F238E27FC236}">
+                <a16:creationId xmlns:a16="http://schemas.microsoft.com/office/drawing/2014/main" id="{1AE5C21C-4848-8445-917F-BE924B01E5C0}"/>
+              </a:ext>
+            </a:extLst>
+          </p:cNvPr>
+          <p:cNvSpPr/>
+          <p:nvPr/>
+        </p:nvSpPr>
+        <p:spPr>
+          <a:xfrm>
+            <a:off x="244115" y="1075174"/>
+            <a:ext cx="9834382" cy="5486400"/>
+          </a:xfrm>
+          <a:prstGeom prst="rect">
+            <a:avLst/>
+          </a:prstGeom>
+          <a:solidFill>
+            <a:schemeClr val="bg1"/>
+          </a:solidFill>
+          <a:ln>
+            <a:noFill/>
+          </a:ln>
+        </p:spPr>
+        <p:style>
+          <a:lnRef idx="2">
+            <a:schemeClr val="accent1">
+              <a:shade val="50000"/>
+            </a:schemeClr>
+          </a:lnRef>
+          <a:fillRef idx="1">
+            <a:schemeClr val="accent1"/>
+          </a:fillRef>
+          <a:effectRef idx="0">
+            <a:schemeClr val="accent1"/>
+          </a:effectRef>
+          <a:fontRef idx="minor">
+            <a:schemeClr val="lt1"/>
+          </a:fontRef>
+        </p:style>
+        <p:txBody>
+          <a:bodyPr rtlCol="0" anchor="ctr"/>
+          <a:lstStyle/>
+          <a:p>
+            <a:pPr algn="ctr"/>
+            <a:r>
+              <a:rPr lang="en-KW"/>
+              <a:t> </a:t>
+            </a:r>
+          </a:p>
+        </p:txBody>
+      </p:sp>
+      <p:grpSp>
+        <p:nvGrpSpPr>
+          <p:cNvPr id="5" name="Group 4">
+            <a:extLst>
+              <a:ext uri="{FF2B5EF4-FFF2-40B4-BE49-F238E27FC236}">
+                <a16:creationId xmlns:a16="http://schemas.microsoft.com/office/drawing/2014/main" id="{B9766E64-ECD1-F14C-87B0-9BCE29AB0106}"/>
+              </a:ext>
+            </a:extLst>
+          </p:cNvPr>
+          <p:cNvGrpSpPr/>
+          <p:nvPr/>
+        </p:nvGrpSpPr>
+        <p:grpSpPr>
+          <a:xfrm>
+            <a:off x="3328666" y="1352444"/>
+            <a:ext cx="6519236" cy="4927776"/>
+            <a:chOff x="4417937" y="1520907"/>
+            <a:chExt cx="5348726" cy="4043008"/>
+          </a:xfrm>
+        </p:grpSpPr>
+        <p:pic>
+          <p:nvPicPr>
+            <p:cNvPr id="6" name="Picture 5">
+              <a:extLst>
+                <a:ext uri="{FF2B5EF4-FFF2-40B4-BE49-F238E27FC236}">
+                  <a16:creationId xmlns:a16="http://schemas.microsoft.com/office/drawing/2014/main" id="{A465FC60-B741-F342-8F57-2999568EA0D8}"/>
+                </a:ext>
+              </a:extLst>
+            </p:cNvPr>
+            <p:cNvPicPr>
+              <a:picLocks noChangeAspect="1"/>
+            </p:cNvPicPr>
+            <p:nvPr/>
+          </p:nvPicPr>
+          <p:blipFill>
+            <a:blip r:embed="rId2"/>
+            <a:stretch>
+              <a:fillRect/>
+            </a:stretch>
+          </p:blipFill>
+          <p:spPr>
+            <a:xfrm>
+              <a:off x="4417937" y="1520907"/>
+              <a:ext cx="5348726" cy="4043008"/>
+            </a:xfrm>
+            <a:prstGeom prst="rect">
+              <a:avLst/>
+            </a:prstGeom>
+          </p:spPr>
+        </p:pic>
+        <p:sp>
+          <p:nvSpPr>
+            <p:cNvPr id="7" name="Rectangle: Rounded Corners 158">
+              <a:extLst>
+                <a:ext uri="{FF2B5EF4-FFF2-40B4-BE49-F238E27FC236}">
+                  <a16:creationId xmlns:a16="http://schemas.microsoft.com/office/drawing/2014/main" id="{BAD5B38E-9096-2245-941E-3C5799882B4A}"/>
+                </a:ext>
+              </a:extLst>
+            </p:cNvPr>
+            <p:cNvSpPr/>
+            <p:nvPr/>
+          </p:nvSpPr>
+          <p:spPr>
+            <a:xfrm>
+              <a:off x="4417937" y="2906486"/>
+              <a:ext cx="3517749" cy="731520"/>
+            </a:xfrm>
+            <a:prstGeom prst="roundRect">
+              <a:avLst/>
+            </a:prstGeom>
+            <a:noFill/>
+            <a:ln w="57150">
+              <a:prstDash val="sysDot"/>
+            </a:ln>
+          </p:spPr>
+          <p:style>
+            <a:lnRef idx="2">
+              <a:schemeClr val="accent1">
+                <a:shade val="50000"/>
+              </a:schemeClr>
+            </a:lnRef>
+            <a:fillRef idx="1">
+              <a:schemeClr val="accent1"/>
+            </a:fillRef>
+            <a:effectRef idx="0">
+              <a:schemeClr val="accent1"/>
+            </a:effectRef>
+            <a:fontRef idx="minor">
+              <a:schemeClr val="lt1"/>
+            </a:fontRef>
+          </p:style>
+          <p:txBody>
+            <a:bodyPr rtlCol="0" anchor="ctr"/>
+            <a:lstStyle/>
+            <a:p>
+              <a:pPr algn="ctr"/>
+              <a:endParaRPr lang="en-US"/>
+            </a:p>
+          </p:txBody>
+        </p:sp>
+      </p:grpSp>
+      <p:grpSp>
+        <p:nvGrpSpPr>
+          <p:cNvPr id="8" name="Group 7">
+            <a:extLst>
+              <a:ext uri="{FF2B5EF4-FFF2-40B4-BE49-F238E27FC236}">
+                <a16:creationId xmlns:a16="http://schemas.microsoft.com/office/drawing/2014/main" id="{003F982E-164A-1A47-B14E-61FBE5FCE96B}"/>
+              </a:ext>
+            </a:extLst>
+          </p:cNvPr>
+          <p:cNvGrpSpPr/>
+          <p:nvPr/>
+        </p:nvGrpSpPr>
+        <p:grpSpPr>
+          <a:xfrm>
+            <a:off x="401934" y="3041242"/>
+            <a:ext cx="2792137" cy="2322600"/>
+            <a:chOff x="6517768" y="2478704"/>
+            <a:chExt cx="2815361" cy="2322600"/>
+          </a:xfrm>
+        </p:grpSpPr>
+        <mc:AlternateContent xmlns:mc="http://schemas.openxmlformats.org/markup-compatibility/2006" xmlns:a14="http://schemas.microsoft.com/office/drawing/2010/main">
+          <mc:Choice Requires="a14">
+            <p:sp>
+              <p:nvSpPr>
+                <p:cNvPr id="9" name="TextBox 8">
+                  <a:extLst>
+                    <a:ext uri="{FF2B5EF4-FFF2-40B4-BE49-F238E27FC236}">
+                      <a16:creationId xmlns:a16="http://schemas.microsoft.com/office/drawing/2014/main" id="{14F0FBA8-88A4-3F46-967F-22ACE59E3CC0}"/>
+                    </a:ext>
+                  </a:extLst>
+                </p:cNvPr>
+                <p:cNvSpPr txBox="1"/>
+                <p:nvPr/>
+              </p:nvSpPr>
+              <p:spPr>
+                <a:xfrm>
+                  <a:off x="6546001" y="2478704"/>
+                  <a:ext cx="2758897" cy="732573"/>
+                </a:xfrm>
+                <a:prstGeom prst="rect">
+                  <a:avLst/>
+                </a:prstGeom>
+                <a:noFill/>
+              </p:spPr>
+              <p:txBody>
+                <a:bodyPr wrap="none" rtlCol="0">
+                  <a:spAutoFit/>
+                </a:bodyPr>
+                <a:lstStyle/>
+                <a:p>
+                  <a:pPr algn="ctr"/>
+                  <a:r>
+                    <a:rPr lang="en-US" sz="2000" b="1" dirty="0"/>
+                    <a:t>Nonlinearity</a:t>
+                  </a:r>
+                </a:p>
+                <a:p>
+                  <a:pPr/>
+                  <a14:m>
+                    <m:oMathPara xmlns:m="http://schemas.openxmlformats.org/officeDocument/2006/math">
+                      <m:oMathParaPr>
+                        <m:jc m:val="centerGroup"/>
+                      </m:oMathParaPr>
+                      <m:oMath xmlns:m="http://schemas.openxmlformats.org/officeDocument/2006/math">
+                        <m:sSub>
+                          <m:sSubPr>
+                            <m:ctrlPr>
+                              <a:rPr lang="en-US" sz="2000" b="0" i="1" smtClean="0">
+                                <a:latin typeface="Cambria Math" panose="02040503050406030204" pitchFamily="18" charset="0"/>
+                              </a:rPr>
+                            </m:ctrlPr>
+                          </m:sSubPr>
+                          <m:e>
+                            <m:r>
+                              <a:rPr lang="en-US" sz="2000" b="0" i="1" smtClean="0">
+                                <a:latin typeface="Cambria Math" panose="02040503050406030204" pitchFamily="18" charset="0"/>
+                              </a:rPr>
+                              <m:t>𝑢</m:t>
+                            </m:r>
+                          </m:e>
+                          <m:sub>
+                            <m:r>
+                              <a:rPr lang="en-US" sz="2000" b="0" i="1" smtClean="0">
+                                <a:latin typeface="Cambria Math" panose="02040503050406030204" pitchFamily="18" charset="0"/>
+                              </a:rPr>
+                              <m:t>𝑗</m:t>
+                            </m:r>
+                          </m:sub>
+                        </m:sSub>
+                        <m:r>
+                          <a:rPr lang="en-US" sz="2000" b="0" i="1" smtClean="0">
+                            <a:latin typeface="Cambria Math" panose="02040503050406030204" pitchFamily="18" charset="0"/>
+                          </a:rPr>
+                          <m:t>=</m:t>
+                        </m:r>
+                        <m:r>
+                          <m:rPr>
+                            <m:sty m:val="p"/>
+                          </m:rPr>
+                          <a:rPr lang="en-US" sz="2000" b="0" i="0" smtClean="0">
+                            <a:latin typeface="Cambria Math" panose="02040503050406030204" pitchFamily="18" charset="0"/>
+                          </a:rPr>
+                          <m:t>tanh</m:t>
+                        </m:r>
+                        <m:r>
+                          <a:rPr lang="en-US" sz="2000" b="0" i="1" smtClean="0">
+                            <a:latin typeface="Cambria Math" panose="02040503050406030204" pitchFamily="18" charset="0"/>
+                          </a:rPr>
+                          <m:t>⁡(</m:t>
+                        </m:r>
+                        <m:sSub>
+                          <m:sSubPr>
+                            <m:ctrlPr>
+                              <a:rPr lang="en-US" sz="2000" b="0" i="1" smtClean="0">
+                                <a:latin typeface="Cambria Math" panose="02040503050406030204" pitchFamily="18" charset="0"/>
+                              </a:rPr>
+                            </m:ctrlPr>
+                          </m:sSubPr>
+                          <m:e>
+                            <m:r>
+                              <a:rPr lang="en-US" sz="2000" b="0" i="1" smtClean="0">
+                                <a:latin typeface="Cambria Math" panose="02040503050406030204" pitchFamily="18" charset="0"/>
+                              </a:rPr>
+                              <m:t>𝑏</m:t>
+                            </m:r>
+                          </m:e>
+                          <m:sub>
+                            <m:r>
+                              <a:rPr lang="en-US" sz="2000" b="0" i="1" smtClean="0">
+                                <a:latin typeface="Cambria Math" panose="02040503050406030204" pitchFamily="18" charset="0"/>
+                              </a:rPr>
+                              <m:t>𝑗</m:t>
+                            </m:r>
+                          </m:sub>
+                        </m:sSub>
+                        <m:r>
+                          <a:rPr lang="en-US" sz="2000" b="0" i="1" smtClean="0">
+                            <a:latin typeface="Cambria Math" panose="02040503050406030204" pitchFamily="18" charset="0"/>
+                          </a:rPr>
+                          <m:t>+∑</m:t>
+                        </m:r>
+                        <m:sSub>
+                          <m:sSubPr>
+                            <m:ctrlPr>
+                              <a:rPr lang="en-US" sz="2000" b="0" i="1" smtClean="0">
+                                <a:latin typeface="Cambria Math" panose="02040503050406030204" pitchFamily="18" charset="0"/>
+                              </a:rPr>
+                            </m:ctrlPr>
+                          </m:sSubPr>
+                          <m:e>
+                            <m:r>
+                              <a:rPr lang="en-US" sz="2000" b="0" i="1" smtClean="0">
+                                <a:latin typeface="Cambria Math" panose="02040503050406030204" pitchFamily="18" charset="0"/>
+                              </a:rPr>
+                              <m:t>𝑤</m:t>
+                            </m:r>
+                          </m:e>
+                          <m:sub>
+                            <m:r>
+                              <a:rPr lang="en-US" sz="2000" b="0" i="1" smtClean="0">
+                                <a:latin typeface="Cambria Math" panose="02040503050406030204" pitchFamily="18" charset="0"/>
+                              </a:rPr>
+                              <m:t>𝑗𝑖</m:t>
+                            </m:r>
+                          </m:sub>
+                        </m:sSub>
+                        <m:sSub>
+                          <m:sSubPr>
+                            <m:ctrlPr>
+                              <a:rPr lang="en-US" sz="2000" b="0" i="1" smtClean="0">
+                                <a:latin typeface="Cambria Math" panose="02040503050406030204" pitchFamily="18" charset="0"/>
+                              </a:rPr>
+                            </m:ctrlPr>
+                          </m:sSubPr>
+                          <m:e>
+                            <m:r>
+                              <a:rPr lang="en-US" sz="2000" b="0" i="1" smtClean="0">
+                                <a:latin typeface="Cambria Math" panose="02040503050406030204" pitchFamily="18" charset="0"/>
+                              </a:rPr>
+                              <m:t>𝑥</m:t>
+                            </m:r>
+                          </m:e>
+                          <m:sub>
+                            <m:r>
+                              <a:rPr lang="en-US" sz="2000" b="0" i="1" smtClean="0">
+                                <a:latin typeface="Cambria Math" panose="02040503050406030204" pitchFamily="18" charset="0"/>
+                              </a:rPr>
+                              <m:t>𝑖</m:t>
+                            </m:r>
+                          </m:sub>
+                        </m:sSub>
+                        <m:r>
+                          <a:rPr lang="en-US" sz="2000" b="0" i="1" smtClean="0">
+                            <a:latin typeface="Cambria Math" panose="02040503050406030204" pitchFamily="18" charset="0"/>
+                          </a:rPr>
+                          <m:t>)</m:t>
+                        </m:r>
+                      </m:oMath>
+                    </m:oMathPara>
+                  </a14:m>
+                  <a:endParaRPr lang="en-US" sz="2000" dirty="0"/>
+                </a:p>
+              </p:txBody>
+            </p:sp>
+          </mc:Choice>
+          <mc:Fallback xmlns="">
+            <p:sp>
+              <p:nvSpPr>
+                <p:cNvPr id="156" name="TextBox 155">
+                  <a:extLst>
+                    <a:ext uri="{FF2B5EF4-FFF2-40B4-BE49-F238E27FC236}">
+                      <a16:creationId xmlns:a16="http://schemas.microsoft.com/office/drawing/2014/main" id="{DD757EFD-B196-4439-8611-10544318F3CE}"/>
+                    </a:ext>
+                  </a:extLst>
+                </p:cNvPr>
+                <p:cNvSpPr txBox="1">
+                  <a:spLocks noRot="1" noChangeAspect="1" noMove="1" noResize="1" noEditPoints="1" noAdjustHandles="1" noChangeArrowheads="1" noChangeShapeType="1" noTextEdit="1"/>
+                </p:cNvSpPr>
+                <p:nvPr/>
+              </p:nvSpPr>
+              <p:spPr>
+                <a:xfrm>
+                  <a:off x="6546001" y="2478704"/>
+                  <a:ext cx="2758897" cy="732573"/>
+                </a:xfrm>
+                <a:prstGeom prst="rect">
+                  <a:avLst/>
+                </a:prstGeom>
+                <a:blipFill>
+                  <a:blip r:embed="rId4"/>
+                  <a:stretch>
+                    <a:fillRect t="-5000" b="-5000"/>
+                  </a:stretch>
+                </a:blipFill>
+              </p:spPr>
+              <p:txBody>
+                <a:bodyPr/>
+                <a:lstStyle/>
+                <a:p>
+                  <a:r>
+                    <a:rPr lang="en-US">
+                      <a:noFill/>
+                    </a:rPr>
+                    <a:t> </a:t>
+                  </a:r>
+                </a:p>
+              </p:txBody>
+            </p:sp>
+          </mc:Fallback>
+        </mc:AlternateContent>
+        <p:pic>
+          <p:nvPicPr>
+            <p:cNvPr id="10" name="Picture 9">
+              <a:extLst>
+                <a:ext uri="{FF2B5EF4-FFF2-40B4-BE49-F238E27FC236}">
+                  <a16:creationId xmlns:a16="http://schemas.microsoft.com/office/drawing/2014/main" id="{11DA6B0B-F291-0A47-85B2-97B2939CDCB1}"/>
+                </a:ext>
+              </a:extLst>
+            </p:cNvPr>
+            <p:cNvPicPr>
+              <a:picLocks noChangeAspect="1"/>
+            </p:cNvPicPr>
+            <p:nvPr/>
+          </p:nvPicPr>
+          <p:blipFill rotWithShape="1">
+            <a:blip r:embed="rId5">
+              <a:extLst>
+                <a:ext uri="{28A0092B-C50C-407E-A947-70E740481C1C}">
+                  <a14:useLocalDpi xmlns:a14="http://schemas.microsoft.com/office/drawing/2010/main" val="0"/>
+                </a:ext>
+              </a:extLst>
+            </a:blip>
+            <a:srcRect l="49113"/>
+            <a:stretch/>
+          </p:blipFill>
+          <p:spPr>
+            <a:xfrm>
+              <a:off x="6517768" y="3230629"/>
+              <a:ext cx="2815361" cy="1570675"/>
+            </a:xfrm>
+            <a:prstGeom prst="rect">
+              <a:avLst/>
+            </a:prstGeom>
+          </p:spPr>
+        </p:pic>
+      </p:grpSp>
+    </p:spTree>
+    <p:extLst>
+      <p:ext uri="{BB962C8B-B14F-4D97-AF65-F5344CB8AC3E}">
+        <p14:creationId xmlns:p14="http://schemas.microsoft.com/office/powerpoint/2010/main" val="1773884636"/>
+      </p:ext>
+    </p:extLst>
+  </p:cSld>
+  <p:clrMapOvr>
+    <a:masterClrMapping/>
+  </p:clrMapOvr>
+  <p:timing>
+    <p:tnLst>
+      <p:par>
+        <p:cTn id="1" dur="indefinite" restart="never" nodeType="tmRoot">
+          <p:childTnLst>
+            <p:seq concurrent="1" nextAc="seek">
+              <p:cTn id="2" dur="indefinite" nodeType="mainSeq">
+                <p:childTnLst>
+                  <p:par>
+                    <p:cTn id="3" fill="hold">
+                      <p:stCondLst>
+                        <p:cond delay="indefinite"/>
+                      </p:stCondLst>
+                      <p:childTnLst>
+                        <p:par>
+                          <p:cTn id="4" fill="hold">
+                            <p:stCondLst>
+                              <p:cond delay="0"/>
+                            </p:stCondLst>
+                            <p:childTnLst>
+                              <p:par>
+                                <p:cTn id="5" presetID="10" presetClass="entr" presetSubtype="0" fill="hold" nodeType="clickEffect">
+                                  <p:stCondLst>
+                                    <p:cond delay="0"/>
+                                  </p:stCondLst>
+                                  <p:childTnLst>
+                                    <p:set>
+                                      <p:cBhvr>
+                                        <p:cTn id="6" dur="1" fill="hold">
+                                          <p:stCondLst>
+                                            <p:cond delay="0"/>
+                                          </p:stCondLst>
+                                        </p:cTn>
+                                        <p:tgtEl>
+                                          <p:spTgt spid="5"/>
+                                        </p:tgtEl>
+                                        <p:attrNameLst>
+                                          <p:attrName>style.visibility</p:attrName>
+                                        </p:attrNameLst>
+                                      </p:cBhvr>
+                                      <p:to>
+                                        <p:strVal val="visible"/>
+                                      </p:to>
+                                    </p:set>
+                                    <p:animEffect transition="in" filter="fade">
+                                      <p:cBhvr>
+                                        <p:cTn id="7" dur="500"/>
+                                        <p:tgtEl>
+                                          <p:spTgt spid="5"/>
+                                        </p:tgtEl>
+                                      </p:cBhvr>
+                                    </p:animEffect>
+                                  </p:childTnLst>
+                                </p:cTn>
+                              </p:par>
+                            </p:childTnLst>
+                          </p:cTn>
+                        </p:par>
+                      </p:childTnLst>
+                    </p:cTn>
+                  </p:par>
+                  <p:par>
+                    <p:cTn id="8" fill="hold">
+                      <p:stCondLst>
+                        <p:cond delay="indefinite"/>
+                      </p:stCondLst>
+                      <p:childTnLst>
+                        <p:par>
+                          <p:cTn id="9" fill="hold">
+                            <p:stCondLst>
+                              <p:cond delay="0"/>
+                            </p:stCondLst>
+                            <p:childTnLst>
+                              <p:par>
+                                <p:cTn id="10" presetID="10" presetClass="entr" presetSubtype="0" fill="hold" nodeType="clickEffect">
+                                  <p:stCondLst>
+                                    <p:cond delay="0"/>
+                                  </p:stCondLst>
+                                  <p:childTnLst>
+                                    <p:set>
+                                      <p:cBhvr>
+                                        <p:cTn id="11" dur="1" fill="hold">
+                                          <p:stCondLst>
+                                            <p:cond delay="0"/>
+                                          </p:stCondLst>
+                                        </p:cTn>
+                                        <p:tgtEl>
+                                          <p:spTgt spid="8"/>
+                                        </p:tgtEl>
+                                        <p:attrNameLst>
+                                          <p:attrName>style.visibility</p:attrName>
+                                        </p:attrNameLst>
+                                      </p:cBhvr>
+                                      <p:to>
+                                        <p:strVal val="visible"/>
+                                      </p:to>
+                                    </p:set>
+                                    <p:animEffect transition="in" filter="fade">
+                                      <p:cBhvr>
+                                        <p:cTn id="12" dur="500"/>
+                                        <p:tgtEl>
+                                          <p:spTgt spid="8"/>
+                                        </p:tgtEl>
+                                      </p:cBhvr>
+                                    </p:animEffect>
+                                  </p:childTnLst>
+                                </p:cTn>
+                              </p:par>
+                            </p:childTnLst>
+                          </p:cTn>
+                        </p:par>
+                      </p:childTnLst>
+                    </p:cTn>
+                  </p:par>
+                </p:childTnLst>
+              </p:cTn>
+              <p:prevCondLst>
+                <p:cond evt="onPrev" delay="0">
+                  <p:tgtEl>
+                    <p:sldTgt/>
+                  </p:tgtEl>
+                </p:cond>
+              </p:prevCondLst>
+              <p:nextCondLst>
+                <p:cond evt="onNext" delay="0">
+                  <p:tgtEl>
+                    <p:sldTgt/>
+                  </p:tgtEl>
+                </p:cond>
+              </p:nextCondLst>
+            </p:seq>
+          </p:childTnLst>
+        </p:cTn>
+      </p:par>
+    </p:tnLst>
+  </p:timing>
 </p:sld>
 </file>
 

</xml_diff>